<commit_message>
- Updated LV slides
</commit_message>
<xml_diff>
--- a/notebooks/03_Latent_variable_theory.pptx
+++ b/notebooks/03_Latent_variable_theory.pptx
@@ -10,12 +10,19 @@
     <p:sldId id="258" r:id="rId4"/>
     <p:sldId id="259" r:id="rId5"/>
     <p:sldId id="262" r:id="rId6"/>
-    <p:sldId id="263" r:id="rId7"/>
-    <p:sldId id="264" r:id="rId8"/>
-    <p:sldId id="265" r:id="rId9"/>
-    <p:sldId id="266" r:id="rId10"/>
-    <p:sldId id="260" r:id="rId11"/>
-    <p:sldId id="261" r:id="rId12"/>
+    <p:sldId id="267" r:id="rId7"/>
+    <p:sldId id="263" r:id="rId8"/>
+    <p:sldId id="264" r:id="rId9"/>
+    <p:sldId id="268" r:id="rId10"/>
+    <p:sldId id="265" r:id="rId11"/>
+    <p:sldId id="269" r:id="rId12"/>
+    <p:sldId id="442" r:id="rId13"/>
+    <p:sldId id="444" r:id="rId14"/>
+    <p:sldId id="270" r:id="rId15"/>
+    <p:sldId id="271" r:id="rId16"/>
+    <p:sldId id="443" r:id="rId17"/>
+    <p:sldId id="260" r:id="rId18"/>
+    <p:sldId id="261" r:id="rId19"/>
   </p:sldIdLst>
   <p:sldSz cx="12192000" cy="6858000"/>
   <p:notesSz cx="6858000" cy="9144000"/>
@@ -269,7 +276,7 @@
           <a:p>
             <a:fld id="{964983ED-8EB3-4B31-BA51-5809E4D487CB}" type="datetimeFigureOut">
               <a:rPr lang="en-US" smtClean="0"/>
-              <a:t>10/14/2020</a:t>
+              <a:t>10/15/2020</a:t>
             </a:fld>
             <a:endParaRPr lang="en-US"/>
           </a:p>
@@ -467,7 +474,7 @@
           <a:p>
             <a:fld id="{964983ED-8EB3-4B31-BA51-5809E4D487CB}" type="datetimeFigureOut">
               <a:rPr lang="en-US" smtClean="0"/>
-              <a:t>10/14/2020</a:t>
+              <a:t>10/15/2020</a:t>
             </a:fld>
             <a:endParaRPr lang="en-US"/>
           </a:p>
@@ -675,7 +682,7 @@
           <a:p>
             <a:fld id="{964983ED-8EB3-4B31-BA51-5809E4D487CB}" type="datetimeFigureOut">
               <a:rPr lang="en-US" smtClean="0"/>
-              <a:t>10/14/2020</a:t>
+              <a:t>10/15/2020</a:t>
             </a:fld>
             <a:endParaRPr lang="en-US"/>
           </a:p>
@@ -873,7 +880,7 @@
           <a:p>
             <a:fld id="{964983ED-8EB3-4B31-BA51-5809E4D487CB}" type="datetimeFigureOut">
               <a:rPr lang="en-US" smtClean="0"/>
-              <a:t>10/14/2020</a:t>
+              <a:t>10/15/2020</a:t>
             </a:fld>
             <a:endParaRPr lang="en-US"/>
           </a:p>
@@ -1148,7 +1155,7 @@
           <a:p>
             <a:fld id="{964983ED-8EB3-4B31-BA51-5809E4D487CB}" type="datetimeFigureOut">
               <a:rPr lang="en-US" smtClean="0"/>
-              <a:t>10/14/2020</a:t>
+              <a:t>10/15/2020</a:t>
             </a:fld>
             <a:endParaRPr lang="en-US"/>
           </a:p>
@@ -1413,7 +1420,7 @@
           <a:p>
             <a:fld id="{964983ED-8EB3-4B31-BA51-5809E4D487CB}" type="datetimeFigureOut">
               <a:rPr lang="en-US" smtClean="0"/>
-              <a:t>10/14/2020</a:t>
+              <a:t>10/15/2020</a:t>
             </a:fld>
             <a:endParaRPr lang="en-US"/>
           </a:p>
@@ -1825,7 +1832,7 @@
           <a:p>
             <a:fld id="{964983ED-8EB3-4B31-BA51-5809E4D487CB}" type="datetimeFigureOut">
               <a:rPr lang="en-US" smtClean="0"/>
-              <a:t>10/14/2020</a:t>
+              <a:t>10/15/2020</a:t>
             </a:fld>
             <a:endParaRPr lang="en-US"/>
           </a:p>
@@ -1966,7 +1973,7 @@
           <a:p>
             <a:fld id="{964983ED-8EB3-4B31-BA51-5809E4D487CB}" type="datetimeFigureOut">
               <a:rPr lang="en-US" smtClean="0"/>
-              <a:t>10/14/2020</a:t>
+              <a:t>10/15/2020</a:t>
             </a:fld>
             <a:endParaRPr lang="en-US"/>
           </a:p>
@@ -2079,7 +2086,7 @@
           <a:p>
             <a:fld id="{964983ED-8EB3-4B31-BA51-5809E4D487CB}" type="datetimeFigureOut">
               <a:rPr lang="en-US" smtClean="0"/>
-              <a:t>10/14/2020</a:t>
+              <a:t>10/15/2020</a:t>
             </a:fld>
             <a:endParaRPr lang="en-US"/>
           </a:p>
@@ -2390,7 +2397,7 @@
           <a:p>
             <a:fld id="{964983ED-8EB3-4B31-BA51-5809E4D487CB}" type="datetimeFigureOut">
               <a:rPr lang="en-US" smtClean="0"/>
-              <a:t>10/14/2020</a:t>
+              <a:t>10/15/2020</a:t>
             </a:fld>
             <a:endParaRPr lang="en-US"/>
           </a:p>
@@ -2678,7 +2685,7 @@
           <a:p>
             <a:fld id="{964983ED-8EB3-4B31-BA51-5809E4D487CB}" type="datetimeFigureOut">
               <a:rPr lang="en-US" smtClean="0"/>
-              <a:t>10/14/2020</a:t>
+              <a:t>10/15/2020</a:t>
             </a:fld>
             <a:endParaRPr lang="en-US"/>
           </a:p>
@@ -2919,7 +2926,7 @@
           <a:p>
             <a:fld id="{964983ED-8EB3-4B31-BA51-5809E4D487CB}" type="datetimeFigureOut">
               <a:rPr lang="en-US" smtClean="0"/>
-              <a:t>10/14/2020</a:t>
+              <a:t>10/15/2020</a:t>
             </a:fld>
             <a:endParaRPr lang="en-US"/>
           </a:p>
@@ -3883,6 +3890,1521 @@
           <p:cNvPr id="2" name="Title 1">
             <a:extLst>
               <a:ext uri="{FF2B5EF4-FFF2-40B4-BE49-F238E27FC236}">
+                <a16:creationId xmlns:a16="http://schemas.microsoft.com/office/drawing/2014/main" id="{C5D465AA-458E-4072-A1C5-B5C67E370172}"/>
+              </a:ext>
+            </a:extLst>
+          </p:cNvPr>
+          <p:cNvSpPr>
+            <a:spLocks noGrp="1"/>
+          </p:cNvSpPr>
+          <p:nvPr>
+            <p:ph type="title"/>
+          </p:nvPr>
+        </p:nvSpPr>
+        <p:spPr/>
+        <p:txBody>
+          <a:bodyPr/>
+          <a:lstStyle/>
+          <a:p>
+            <a:r>
+              <a:rPr lang="en-US" b="1" dirty="0"/>
+              <a:t>Example: Geochemical Exploration</a:t>
+            </a:r>
+          </a:p>
+        </p:txBody>
+      </p:sp>
+      <p:sp>
+        <p:nvSpPr>
+          <p:cNvPr id="3" name="Content Placeholder 2">
+            <a:extLst>
+              <a:ext uri="{FF2B5EF4-FFF2-40B4-BE49-F238E27FC236}">
+                <a16:creationId xmlns:a16="http://schemas.microsoft.com/office/drawing/2014/main" id="{533A18BF-9BBB-4432-A224-9C9EE3411825}"/>
+              </a:ext>
+            </a:extLst>
+          </p:cNvPr>
+          <p:cNvSpPr>
+            <a:spLocks noGrp="1"/>
+          </p:cNvSpPr>
+          <p:nvPr>
+            <p:ph idx="1"/>
+          </p:nvPr>
+        </p:nvSpPr>
+        <p:spPr>
+          <a:xfrm>
+            <a:off x="838200" y="1825625"/>
+            <a:ext cx="5257800" cy="4351338"/>
+          </a:xfrm>
+        </p:spPr>
+        <p:txBody>
+          <a:bodyPr>
+            <a:normAutofit/>
+          </a:bodyPr>
+          <a:lstStyle/>
+          <a:p>
+            <a:r>
+              <a:rPr lang="en-US" b="0" i="0" u="sng" dirty="0">
+                <a:solidFill>
+                  <a:srgbClr val="0088CC"/>
+                </a:solidFill>
+                <a:effectLst/>
+                <a:hlinkClick r:id="rId2"/>
+              </a:rPr>
+              <a:t>Vijay </a:t>
+            </a:r>
+            <a:r>
+              <a:rPr lang="en-US" b="0" i="0" u="sng" dirty="0" err="1">
+                <a:solidFill>
+                  <a:srgbClr val="0088CC"/>
+                </a:solidFill>
+                <a:effectLst/>
+                <a:hlinkClick r:id="rId2"/>
+              </a:rPr>
+              <a:t>S.Tripathi</a:t>
+            </a:r>
+            <a:r>
+              <a:rPr lang="en-US" b="0" i="0" u="sng" dirty="0">
+                <a:solidFill>
+                  <a:srgbClr val="0088CC"/>
+                </a:solidFill>
+                <a:effectLst/>
+                <a:hlinkClick r:id="rId2"/>
+              </a:rPr>
+              <a:t> (1979)</a:t>
+            </a:r>
+            <a:r>
+              <a:rPr lang="en-US" b="0" i="0" dirty="0">
+                <a:solidFill>
+                  <a:srgbClr val="000000"/>
+                </a:solidFill>
+                <a:effectLst/>
+              </a:rPr>
+              <a:t> applied </a:t>
+            </a:r>
+            <a:r>
+              <a:rPr lang="en-US" b="1" i="0" dirty="0">
+                <a:solidFill>
+                  <a:srgbClr val="000000"/>
+                </a:solidFill>
+                <a:effectLst/>
+              </a:rPr>
+              <a:t>factor analysis</a:t>
+            </a:r>
+            <a:r>
+              <a:rPr lang="en-US" b="0" i="0" dirty="0">
+                <a:solidFill>
+                  <a:srgbClr val="000000"/>
+                </a:solidFill>
+                <a:effectLst/>
+              </a:rPr>
+              <a:t> on the chemical compositions of soil samples (10 chemical elements) and derived 4 factors. Hunt and </a:t>
+            </a:r>
+            <a:r>
+              <a:rPr lang="en-US" b="0" i="0" dirty="0" err="1">
+                <a:solidFill>
+                  <a:srgbClr val="000000"/>
+                </a:solidFill>
+                <a:effectLst/>
+              </a:rPr>
+              <a:t>Gilkes</a:t>
+            </a:r>
+            <a:r>
+              <a:rPr lang="en-US" b="0" i="0" dirty="0">
+                <a:solidFill>
+                  <a:srgbClr val="000000"/>
+                </a:solidFill>
+                <a:effectLst/>
+              </a:rPr>
+              <a:t> (1992) used similar approach and resulted in a </a:t>
+            </a:r>
+            <a:r>
+              <a:rPr lang="en-US" b="0" i="1" dirty="0">
+                <a:solidFill>
+                  <a:srgbClr val="000000"/>
+                </a:solidFill>
+                <a:effectLst/>
+              </a:rPr>
+              <a:t>soil textural triangle</a:t>
+            </a:r>
+            <a:r>
+              <a:rPr lang="en-US" b="0" i="0" dirty="0">
+                <a:solidFill>
+                  <a:srgbClr val="000000"/>
+                </a:solidFill>
+                <a:effectLst/>
+              </a:rPr>
+              <a:t>. (further details in </a:t>
+            </a:r>
+            <a:r>
+              <a:rPr lang="en-US" b="0" i="0" u="sng" dirty="0">
+                <a:solidFill>
+                  <a:srgbClr val="0088CC"/>
+                </a:solidFill>
+                <a:effectLst/>
+                <a:hlinkClick r:id="rId3"/>
+              </a:rPr>
+              <a:t>Measuring Soil Texture in the Laboratory</a:t>
+            </a:r>
+            <a:r>
+              <a:rPr lang="en-US" b="0" i="0" dirty="0">
+                <a:solidFill>
+                  <a:srgbClr val="000000"/>
+                </a:solidFill>
+                <a:effectLst/>
+              </a:rPr>
+              <a:t>)</a:t>
+            </a:r>
+            <a:endParaRPr lang="en-US" dirty="0"/>
+          </a:p>
+        </p:txBody>
+      </p:sp>
+      <p:pic>
+        <p:nvPicPr>
+          <p:cNvPr id="5122" name="Picture 2">
+            <a:extLst>
+              <a:ext uri="{FF2B5EF4-FFF2-40B4-BE49-F238E27FC236}">
+                <a16:creationId xmlns:a16="http://schemas.microsoft.com/office/drawing/2014/main" id="{D1F477E3-3B9A-4B6A-9E47-A36055AD8F57}"/>
+              </a:ext>
+            </a:extLst>
+          </p:cNvPr>
+          <p:cNvPicPr>
+            <a:picLocks noChangeAspect="1" noChangeArrowheads="1"/>
+          </p:cNvPicPr>
+          <p:nvPr/>
+        </p:nvPicPr>
+        <p:blipFill>
+          <a:blip r:embed="rId4">
+            <a:extLst>
+              <a:ext uri="{28A0092B-C50C-407E-A947-70E740481C1C}">
+                <a14:useLocalDpi xmlns:a14="http://schemas.microsoft.com/office/drawing/2010/main" val="0"/>
+              </a:ext>
+            </a:extLst>
+          </a:blip>
+          <a:srcRect/>
+          <a:stretch>
+            <a:fillRect/>
+          </a:stretch>
+        </p:blipFill>
+        <p:spPr bwMode="auto">
+          <a:xfrm>
+            <a:off x="6243535" y="1690688"/>
+            <a:ext cx="5110265" cy="4486275"/>
+          </a:xfrm>
+          <a:prstGeom prst="rect">
+            <a:avLst/>
+          </a:prstGeom>
+          <a:noFill/>
+          <a:extLst>
+            <a:ext uri="{909E8E84-426E-40DD-AFC4-6F175D3DCCD1}">
+              <a14:hiddenFill xmlns:a14="http://schemas.microsoft.com/office/drawing/2010/main">
+                <a:solidFill>
+                  <a:srgbClr val="FFFFFF"/>
+                </a:solidFill>
+              </a14:hiddenFill>
+            </a:ext>
+          </a:extLst>
+        </p:spPr>
+      </p:pic>
+    </p:spTree>
+    <p:extLst>
+      <p:ext uri="{BB962C8B-B14F-4D97-AF65-F5344CB8AC3E}">
+        <p14:creationId xmlns:p14="http://schemas.microsoft.com/office/powerpoint/2010/main" val="1448174733"/>
+      </p:ext>
+    </p:extLst>
+  </p:cSld>
+  <p:clrMapOvr>
+    <a:masterClrMapping/>
+  </p:clrMapOvr>
+</p:sld>
+</file>
+
+<file path=ppt/slides/slide11.xml><?xml version="1.0" encoding="utf-8"?>
+<p:sld xmlns:a="http://schemas.openxmlformats.org/drawingml/2006/main" xmlns:r="http://schemas.openxmlformats.org/officeDocument/2006/relationships" xmlns:p="http://schemas.openxmlformats.org/presentationml/2006/main">
+  <p:cSld>
+    <p:spTree>
+      <p:nvGrpSpPr>
+        <p:cNvPr id="1" name=""/>
+        <p:cNvGrpSpPr/>
+        <p:nvPr/>
+      </p:nvGrpSpPr>
+      <p:grpSpPr>
+        <a:xfrm>
+          <a:off x="0" y="0"/>
+          <a:ext cx="0" cy="0"/>
+          <a:chOff x="0" y="0"/>
+          <a:chExt cx="0" cy="0"/>
+        </a:xfrm>
+      </p:grpSpPr>
+      <p:pic>
+        <p:nvPicPr>
+          <p:cNvPr id="2050" name="Picture 2">
+            <a:extLst>
+              <a:ext uri="{FF2B5EF4-FFF2-40B4-BE49-F238E27FC236}">
+                <a16:creationId xmlns:a16="http://schemas.microsoft.com/office/drawing/2014/main" id="{0A4E5D96-2BD2-445B-857E-69761C4821F6}"/>
+              </a:ext>
+            </a:extLst>
+          </p:cNvPr>
+          <p:cNvPicPr>
+            <a:picLocks noChangeAspect="1" noChangeArrowheads="1"/>
+          </p:cNvPicPr>
+          <p:nvPr/>
+        </p:nvPicPr>
+        <p:blipFill>
+          <a:blip r:embed="rId2">
+            <a:extLst>
+              <a:ext uri="{28A0092B-C50C-407E-A947-70E740481C1C}">
+                <a14:useLocalDpi xmlns:a14="http://schemas.microsoft.com/office/drawing/2010/main" val="0"/>
+              </a:ext>
+            </a:extLst>
+          </a:blip>
+          <a:srcRect/>
+          <a:stretch>
+            <a:fillRect/>
+          </a:stretch>
+        </p:blipFill>
+        <p:spPr bwMode="auto">
+          <a:xfrm>
+            <a:off x="7647709" y="365125"/>
+            <a:ext cx="4091854" cy="6203778"/>
+          </a:xfrm>
+          <a:prstGeom prst="rect">
+            <a:avLst/>
+          </a:prstGeom>
+          <a:noFill/>
+          <a:extLst>
+            <a:ext uri="{909E8E84-426E-40DD-AFC4-6F175D3DCCD1}">
+              <a14:hiddenFill xmlns:a14="http://schemas.microsoft.com/office/drawing/2010/main">
+                <a:solidFill>
+                  <a:srgbClr val="FFFFFF"/>
+                </a:solidFill>
+              </a14:hiddenFill>
+            </a:ext>
+          </a:extLst>
+        </p:spPr>
+      </p:pic>
+      <p:pic>
+        <p:nvPicPr>
+          <p:cNvPr id="4" name="Picture 2">
+            <a:extLst>
+              <a:ext uri="{FF2B5EF4-FFF2-40B4-BE49-F238E27FC236}">
+                <a16:creationId xmlns:a16="http://schemas.microsoft.com/office/drawing/2014/main" id="{BD335AFE-A301-4946-A3FC-28BF7EC87063}"/>
+              </a:ext>
+            </a:extLst>
+          </p:cNvPr>
+          <p:cNvPicPr>
+            <a:picLocks noChangeAspect="1" noChangeArrowheads="1"/>
+          </p:cNvPicPr>
+          <p:nvPr/>
+        </p:nvPicPr>
+        <p:blipFill>
+          <a:blip r:embed="rId3">
+            <a:extLst>
+              <a:ext uri="{28A0092B-C50C-407E-A947-70E740481C1C}">
+                <a14:useLocalDpi xmlns:a14="http://schemas.microsoft.com/office/drawing/2010/main" val="0"/>
+              </a:ext>
+            </a:extLst>
+          </a:blip>
+          <a:srcRect/>
+          <a:stretch>
+            <a:fillRect/>
+          </a:stretch>
+        </p:blipFill>
+        <p:spPr bwMode="auto">
+          <a:xfrm>
+            <a:off x="452437" y="365125"/>
+            <a:ext cx="7066653" cy="6203778"/>
+          </a:xfrm>
+          <a:prstGeom prst="rect">
+            <a:avLst/>
+          </a:prstGeom>
+          <a:noFill/>
+          <a:extLst>
+            <a:ext uri="{909E8E84-426E-40DD-AFC4-6F175D3DCCD1}">
+              <a14:hiddenFill xmlns:a14="http://schemas.microsoft.com/office/drawing/2010/main">
+                <a:solidFill>
+                  <a:srgbClr val="FFFFFF"/>
+                </a:solidFill>
+              </a14:hiddenFill>
+            </a:ext>
+          </a:extLst>
+        </p:spPr>
+      </p:pic>
+    </p:spTree>
+    <p:extLst>
+      <p:ext uri="{BB962C8B-B14F-4D97-AF65-F5344CB8AC3E}">
+        <p14:creationId xmlns:p14="http://schemas.microsoft.com/office/powerpoint/2010/main" val="3305546988"/>
+      </p:ext>
+    </p:extLst>
+  </p:cSld>
+  <p:clrMapOvr>
+    <a:masterClrMapping/>
+  </p:clrMapOvr>
+</p:sld>
+</file>
+
+<file path=ppt/slides/slide12.xml><?xml version="1.0" encoding="utf-8"?>
+<p:sld xmlns:a="http://schemas.openxmlformats.org/drawingml/2006/main" xmlns:r="http://schemas.openxmlformats.org/officeDocument/2006/relationships" xmlns:p="http://schemas.openxmlformats.org/presentationml/2006/main">
+  <p:cSld>
+    <p:spTree>
+      <p:nvGrpSpPr>
+        <p:cNvPr id="1" name=""/>
+        <p:cNvGrpSpPr/>
+        <p:nvPr/>
+      </p:nvGrpSpPr>
+      <p:grpSpPr>
+        <a:xfrm>
+          <a:off x="0" y="0"/>
+          <a:ext cx="0" cy="0"/>
+          <a:chOff x="0" y="0"/>
+          <a:chExt cx="0" cy="0"/>
+        </a:xfrm>
+      </p:grpSpPr>
+      <p:sp>
+        <p:nvSpPr>
+          <p:cNvPr id="2" name="Title 1">
+            <a:extLst>
+              <a:ext uri="{FF2B5EF4-FFF2-40B4-BE49-F238E27FC236}">
+                <a16:creationId xmlns:a16="http://schemas.microsoft.com/office/drawing/2014/main" id="{04B67796-A5BE-496A-811C-FA8CE51D3454}"/>
+              </a:ext>
+            </a:extLst>
+          </p:cNvPr>
+          <p:cNvSpPr>
+            <a:spLocks noGrp="1"/>
+          </p:cNvSpPr>
+          <p:nvPr>
+            <p:ph type="title"/>
+          </p:nvPr>
+        </p:nvSpPr>
+        <p:spPr/>
+        <p:txBody>
+          <a:bodyPr/>
+          <a:lstStyle/>
+          <a:p>
+            <a:r>
+              <a:rPr lang="en-US" b="1" dirty="0"/>
+              <a:t>Example: Word Embeddings</a:t>
+            </a:r>
+          </a:p>
+        </p:txBody>
+      </p:sp>
+      <p:sp>
+        <p:nvSpPr>
+          <p:cNvPr id="3" name="Content Placeholder 2">
+            <a:extLst>
+              <a:ext uri="{FF2B5EF4-FFF2-40B4-BE49-F238E27FC236}">
+                <a16:creationId xmlns:a16="http://schemas.microsoft.com/office/drawing/2014/main" id="{750CE98F-4F6E-47FA-A78F-073BFBEC4E40}"/>
+              </a:ext>
+            </a:extLst>
+          </p:cNvPr>
+          <p:cNvSpPr>
+            <a:spLocks noGrp="1"/>
+          </p:cNvSpPr>
+          <p:nvPr>
+            <p:ph idx="1"/>
+          </p:nvPr>
+        </p:nvSpPr>
+        <p:spPr/>
+        <p:txBody>
+          <a:bodyPr/>
+          <a:lstStyle/>
+          <a:p>
+            <a:r>
+              <a:rPr lang="en-US" dirty="0"/>
+              <a:t>In one sentence: </a:t>
+            </a:r>
+            <a:r>
+              <a:rPr lang="en-US" b="1" dirty="0"/>
+              <a:t>a framework to convert a word into a vector</a:t>
+            </a:r>
+            <a:r>
+              <a:rPr lang="en-US" dirty="0"/>
+              <a:t>.</a:t>
+            </a:r>
+          </a:p>
+        </p:txBody>
+      </p:sp>
+      <p:sp>
+        <p:nvSpPr>
+          <p:cNvPr id="4" name="Rectangle 3">
+            <a:extLst>
+              <a:ext uri="{FF2B5EF4-FFF2-40B4-BE49-F238E27FC236}">
+                <a16:creationId xmlns:a16="http://schemas.microsoft.com/office/drawing/2014/main" id="{D0C29931-464C-4EB6-B5F1-E417E1BE8C94}"/>
+              </a:ext>
+            </a:extLst>
+          </p:cNvPr>
+          <p:cNvSpPr/>
+          <p:nvPr/>
+        </p:nvSpPr>
+        <p:spPr>
+          <a:xfrm>
+            <a:off x="6776795" y="6311900"/>
+            <a:ext cx="4712637" cy="369332"/>
+          </a:xfrm>
+          <a:prstGeom prst="rect">
+            <a:avLst/>
+          </a:prstGeom>
+        </p:spPr>
+        <p:txBody>
+          <a:bodyPr wrap="none">
+            <a:spAutoFit/>
+          </a:bodyPr>
+          <a:lstStyle/>
+          <a:p>
+            <a:r>
+              <a:rPr lang="en-US" dirty="0">
+                <a:hlinkClick r:id="rId2"/>
+              </a:rPr>
+              <a:t>https://en.wikipedia.org/wiki/Word_embedding</a:t>
+            </a:r>
+            <a:endParaRPr lang="en-US" dirty="0"/>
+          </a:p>
+        </p:txBody>
+      </p:sp>
+      <p:pic>
+        <p:nvPicPr>
+          <p:cNvPr id="2050" name="Picture 2" descr="Image result for word embedding">
+            <a:extLst>
+              <a:ext uri="{FF2B5EF4-FFF2-40B4-BE49-F238E27FC236}">
+                <a16:creationId xmlns:a16="http://schemas.microsoft.com/office/drawing/2014/main" id="{654E851F-C1C7-4876-9871-0C05A6933686}"/>
+              </a:ext>
+            </a:extLst>
+          </p:cNvPr>
+          <p:cNvPicPr>
+            <a:picLocks noChangeAspect="1" noChangeArrowheads="1"/>
+          </p:cNvPicPr>
+          <p:nvPr/>
+        </p:nvPicPr>
+        <p:blipFill>
+          <a:blip r:embed="rId3">
+            <a:extLst>
+              <a:ext uri="{28A0092B-C50C-407E-A947-70E740481C1C}">
+                <a14:useLocalDpi xmlns:a14="http://schemas.microsoft.com/office/drawing/2010/main" val="0"/>
+              </a:ext>
+            </a:extLst>
+          </a:blip>
+          <a:srcRect/>
+          <a:stretch>
+            <a:fillRect/>
+          </a:stretch>
+        </p:blipFill>
+        <p:spPr bwMode="auto">
+          <a:xfrm>
+            <a:off x="1173957" y="2261993"/>
+            <a:ext cx="3340170" cy="4230882"/>
+          </a:xfrm>
+          <a:prstGeom prst="rect">
+            <a:avLst/>
+          </a:prstGeom>
+          <a:noFill/>
+          <a:extLst>
+            <a:ext uri="{909E8E84-426E-40DD-AFC4-6F175D3DCCD1}">
+              <a14:hiddenFill xmlns:a14="http://schemas.microsoft.com/office/drawing/2010/main">
+                <a:solidFill>
+                  <a:srgbClr val="FFFFFF"/>
+                </a:solidFill>
+              </a14:hiddenFill>
+            </a:ext>
+          </a:extLst>
+        </p:spPr>
+      </p:pic>
+      <p:sp>
+        <p:nvSpPr>
+          <p:cNvPr id="5" name="Rectangle 4">
+            <a:extLst>
+              <a:ext uri="{FF2B5EF4-FFF2-40B4-BE49-F238E27FC236}">
+                <a16:creationId xmlns:a16="http://schemas.microsoft.com/office/drawing/2014/main" id="{83F3C02F-AB3C-4090-803B-E48213244DCE}"/>
+              </a:ext>
+            </a:extLst>
+          </p:cNvPr>
+          <p:cNvSpPr/>
+          <p:nvPr/>
+        </p:nvSpPr>
+        <p:spPr>
+          <a:xfrm>
+            <a:off x="5214395" y="2872433"/>
+            <a:ext cx="5920451" cy="2308324"/>
+          </a:xfrm>
+          <a:prstGeom prst="rect">
+            <a:avLst/>
+          </a:prstGeom>
+        </p:spPr>
+        <p:txBody>
+          <a:bodyPr wrap="square">
+            <a:spAutoFit/>
+          </a:bodyPr>
+          <a:lstStyle/>
+          <a:p>
+            <a:r>
+              <a:rPr lang="en-US" sz="2400" b="1" dirty="0">
+                <a:solidFill>
+                  <a:srgbClr val="222222"/>
+                </a:solidFill>
+                <a:latin typeface="Arial" panose="020B0604020202020204" pitchFamily="34" charset="0"/>
+              </a:rPr>
+              <a:t>Word embedding</a:t>
+            </a:r>
+            <a:r>
+              <a:rPr lang="en-US" sz="2400" dirty="0">
+                <a:solidFill>
+                  <a:srgbClr val="222222"/>
+                </a:solidFill>
+                <a:latin typeface="Arial" panose="020B0604020202020204" pitchFamily="34" charset="0"/>
+              </a:rPr>
+              <a:t> is the collective name for a set of </a:t>
+            </a:r>
+            <a:r>
+              <a:rPr lang="en-US" sz="2400" dirty="0">
+                <a:solidFill>
+                  <a:srgbClr val="0B0080"/>
+                </a:solidFill>
+                <a:latin typeface="Arial" panose="020B0604020202020204" pitchFamily="34" charset="0"/>
+                <a:hlinkClick r:id="rId4" tooltip="Language model"/>
+              </a:rPr>
+              <a:t>language modeling</a:t>
+            </a:r>
+            <a:r>
+              <a:rPr lang="en-US" sz="2400" dirty="0">
+                <a:solidFill>
+                  <a:srgbClr val="222222"/>
+                </a:solidFill>
+                <a:latin typeface="Arial" panose="020B0604020202020204" pitchFamily="34" charset="0"/>
+              </a:rPr>
+              <a:t> and </a:t>
+            </a:r>
+            <a:r>
+              <a:rPr lang="en-US" sz="2400" dirty="0">
+                <a:solidFill>
+                  <a:srgbClr val="0B0080"/>
+                </a:solidFill>
+                <a:latin typeface="Arial" panose="020B0604020202020204" pitchFamily="34" charset="0"/>
+                <a:hlinkClick r:id="rId5" tooltip="Feature learning"/>
+              </a:rPr>
+              <a:t>feature learning</a:t>
+            </a:r>
+            <a:r>
+              <a:rPr lang="en-US" sz="2400" dirty="0">
+                <a:solidFill>
+                  <a:srgbClr val="222222"/>
+                </a:solidFill>
+                <a:latin typeface="Arial" panose="020B0604020202020204" pitchFamily="34" charset="0"/>
+              </a:rPr>
+              <a:t> techniques in </a:t>
+            </a:r>
+            <a:r>
+              <a:rPr lang="en-US" sz="2400" b="1" i="1" dirty="0">
+                <a:solidFill>
+                  <a:srgbClr val="0B0080"/>
+                </a:solidFill>
+                <a:latin typeface="Arial" panose="020B0604020202020204" pitchFamily="34" charset="0"/>
+                <a:hlinkClick r:id="rId6" tooltip="Natural language processing"/>
+              </a:rPr>
+              <a:t>natural language processing</a:t>
+            </a:r>
+            <a:r>
+              <a:rPr lang="en-US" sz="2400" b="1" i="1" dirty="0">
+                <a:solidFill>
+                  <a:srgbClr val="222222"/>
+                </a:solidFill>
+                <a:latin typeface="Arial" panose="020B0604020202020204" pitchFamily="34" charset="0"/>
+              </a:rPr>
+              <a:t> (NLP)</a:t>
+            </a:r>
+            <a:r>
+              <a:rPr lang="en-US" sz="2400" dirty="0">
+                <a:solidFill>
+                  <a:srgbClr val="222222"/>
+                </a:solidFill>
+                <a:latin typeface="Arial" panose="020B0604020202020204" pitchFamily="34" charset="0"/>
+              </a:rPr>
+              <a:t> where words or phrases from the vocabulary are mapped to </a:t>
+            </a:r>
+            <a:r>
+              <a:rPr lang="en-US" sz="2400" dirty="0">
+                <a:solidFill>
+                  <a:srgbClr val="0B0080"/>
+                </a:solidFill>
+                <a:latin typeface="Arial" panose="020B0604020202020204" pitchFamily="34" charset="0"/>
+                <a:hlinkClick r:id="rId7" tooltip="Vector (mathematics)"/>
+              </a:rPr>
+              <a:t>vectors</a:t>
+            </a:r>
+            <a:r>
+              <a:rPr lang="en-US" sz="2400" dirty="0">
+                <a:solidFill>
+                  <a:srgbClr val="222222"/>
+                </a:solidFill>
+                <a:latin typeface="Arial" panose="020B0604020202020204" pitchFamily="34" charset="0"/>
+              </a:rPr>
+              <a:t> of </a:t>
+            </a:r>
+            <a:r>
+              <a:rPr lang="en-US" sz="2400" dirty="0">
+                <a:solidFill>
+                  <a:srgbClr val="0B0080"/>
+                </a:solidFill>
+                <a:latin typeface="Arial" panose="020B0604020202020204" pitchFamily="34" charset="0"/>
+                <a:hlinkClick r:id="rId8" tooltip="Real numbers"/>
+              </a:rPr>
+              <a:t>real numbers</a:t>
+            </a:r>
+            <a:r>
+              <a:rPr lang="en-US" sz="2400" dirty="0">
+                <a:solidFill>
+                  <a:srgbClr val="222222"/>
+                </a:solidFill>
+                <a:latin typeface="Arial" panose="020B0604020202020204" pitchFamily="34" charset="0"/>
+              </a:rPr>
+              <a:t>.</a:t>
+            </a:r>
+            <a:endParaRPr lang="en-US" sz="2400" dirty="0"/>
+          </a:p>
+        </p:txBody>
+      </p:sp>
+    </p:spTree>
+    <p:extLst>
+      <p:ext uri="{BB962C8B-B14F-4D97-AF65-F5344CB8AC3E}">
+        <p14:creationId xmlns:p14="http://schemas.microsoft.com/office/powerpoint/2010/main" val="4191825731"/>
+      </p:ext>
+    </p:extLst>
+  </p:cSld>
+  <p:clrMapOvr>
+    <a:masterClrMapping/>
+  </p:clrMapOvr>
+</p:sld>
+</file>
+
+<file path=ppt/slides/slide13.xml><?xml version="1.0" encoding="utf-8"?>
+<p:sld xmlns:a="http://schemas.openxmlformats.org/drawingml/2006/main" xmlns:r="http://schemas.openxmlformats.org/officeDocument/2006/relationships" xmlns:p="http://schemas.openxmlformats.org/presentationml/2006/main">
+  <p:cSld>
+    <p:spTree>
+      <p:nvGrpSpPr>
+        <p:cNvPr id="1" name=""/>
+        <p:cNvGrpSpPr/>
+        <p:nvPr/>
+      </p:nvGrpSpPr>
+      <p:grpSpPr>
+        <a:xfrm>
+          <a:off x="0" y="0"/>
+          <a:ext cx="0" cy="0"/>
+          <a:chOff x="0" y="0"/>
+          <a:chExt cx="0" cy="0"/>
+        </a:xfrm>
+      </p:grpSpPr>
+      <p:pic>
+        <p:nvPicPr>
+          <p:cNvPr id="5" name="Picture 4">
+            <a:extLst>
+              <a:ext uri="{FF2B5EF4-FFF2-40B4-BE49-F238E27FC236}">
+                <a16:creationId xmlns:a16="http://schemas.microsoft.com/office/drawing/2014/main" id="{DC87BC85-1411-48E9-8D95-B80964F3F1CC}"/>
+              </a:ext>
+            </a:extLst>
+          </p:cNvPr>
+          <p:cNvPicPr>
+            <a:picLocks noChangeAspect="1"/>
+          </p:cNvPicPr>
+          <p:nvPr/>
+        </p:nvPicPr>
+        <p:blipFill>
+          <a:blip r:embed="rId2"/>
+          <a:stretch>
+            <a:fillRect/>
+          </a:stretch>
+        </p:blipFill>
+        <p:spPr>
+          <a:xfrm>
+            <a:off x="6085721" y="1825625"/>
+            <a:ext cx="5827870" cy="4161099"/>
+          </a:xfrm>
+          <a:prstGeom prst="rect">
+            <a:avLst/>
+          </a:prstGeom>
+        </p:spPr>
+      </p:pic>
+      <p:sp>
+        <p:nvSpPr>
+          <p:cNvPr id="2" name="Title 1">
+            <a:extLst>
+              <a:ext uri="{FF2B5EF4-FFF2-40B4-BE49-F238E27FC236}">
+                <a16:creationId xmlns:a16="http://schemas.microsoft.com/office/drawing/2014/main" id="{04B67796-A5BE-496A-811C-FA8CE51D3454}"/>
+              </a:ext>
+            </a:extLst>
+          </p:cNvPr>
+          <p:cNvSpPr>
+            <a:spLocks noGrp="1"/>
+          </p:cNvSpPr>
+          <p:nvPr>
+            <p:ph type="title"/>
+          </p:nvPr>
+        </p:nvSpPr>
+        <p:spPr>
+          <a:xfrm>
+            <a:off x="838200" y="365125"/>
+            <a:ext cx="10515600" cy="1325563"/>
+          </a:xfrm>
+          <a:ln>
+            <a:noFill/>
+          </a:ln>
+        </p:spPr>
+        <p:txBody>
+          <a:bodyPr/>
+          <a:lstStyle/>
+          <a:p>
+            <a:r>
+              <a:rPr lang="en-US" b="1" dirty="0"/>
+              <a:t>How do human process language?</a:t>
+            </a:r>
+          </a:p>
+        </p:txBody>
+      </p:sp>
+      <p:sp>
+        <p:nvSpPr>
+          <p:cNvPr id="3" name="Content Placeholder 2">
+            <a:extLst>
+              <a:ext uri="{FF2B5EF4-FFF2-40B4-BE49-F238E27FC236}">
+                <a16:creationId xmlns:a16="http://schemas.microsoft.com/office/drawing/2014/main" id="{750CE98F-4F6E-47FA-A78F-073BFBEC4E40}"/>
+              </a:ext>
+            </a:extLst>
+          </p:cNvPr>
+          <p:cNvSpPr>
+            <a:spLocks noGrp="1"/>
+          </p:cNvSpPr>
+          <p:nvPr>
+            <p:ph idx="1"/>
+          </p:nvPr>
+        </p:nvSpPr>
+        <p:spPr>
+          <a:xfrm>
+            <a:off x="838201" y="1825625"/>
+            <a:ext cx="5525928" cy="4351338"/>
+          </a:xfrm>
+        </p:spPr>
+        <p:txBody>
+          <a:bodyPr/>
+          <a:lstStyle/>
+          <a:p>
+            <a:r>
+              <a:rPr lang="en-US" dirty="0"/>
+              <a:t>We don’t really process “words” according to their </a:t>
+            </a:r>
+            <a:r>
+              <a:rPr lang="en-US" b="1" dirty="0"/>
+              <a:t>dictionary</a:t>
+            </a:r>
+            <a:r>
+              <a:rPr lang="en-US" dirty="0"/>
+              <a:t> definitions.</a:t>
+            </a:r>
+          </a:p>
+          <a:p>
+            <a:r>
+              <a:rPr lang="en-US" dirty="0"/>
+              <a:t>We map a word onto a </a:t>
+            </a:r>
+            <a:r>
+              <a:rPr lang="en-US" b="1" dirty="0"/>
+              <a:t>space of semantics</a:t>
+            </a:r>
+            <a:r>
+              <a:rPr lang="en-US" dirty="0"/>
+              <a:t> (or meaning).</a:t>
+            </a:r>
+          </a:p>
+          <a:p>
+            <a:r>
+              <a:rPr lang="en-US" dirty="0"/>
+              <a:t>We </a:t>
+            </a:r>
+            <a:r>
+              <a:rPr lang="en-US" b="1" dirty="0"/>
+              <a:t>reason and infer</a:t>
+            </a:r>
+            <a:r>
+              <a:rPr lang="en-US" dirty="0"/>
+              <a:t> the meaning in this space.</a:t>
+            </a:r>
+          </a:p>
+          <a:p>
+            <a:r>
+              <a:rPr lang="en-US" dirty="0"/>
+              <a:t>How do we mimic this process?</a:t>
+            </a:r>
+          </a:p>
+        </p:txBody>
+      </p:sp>
+      <p:sp>
+        <p:nvSpPr>
+          <p:cNvPr id="4" name="Rectangle 3">
+            <a:extLst>
+              <a:ext uri="{FF2B5EF4-FFF2-40B4-BE49-F238E27FC236}">
+                <a16:creationId xmlns:a16="http://schemas.microsoft.com/office/drawing/2014/main" id="{D0C29931-464C-4EB6-B5F1-E417E1BE8C94}"/>
+              </a:ext>
+            </a:extLst>
+          </p:cNvPr>
+          <p:cNvSpPr/>
+          <p:nvPr/>
+        </p:nvSpPr>
+        <p:spPr>
+          <a:xfrm>
+            <a:off x="7200954" y="6308209"/>
+            <a:ext cx="4712637" cy="369332"/>
+          </a:xfrm>
+          <a:prstGeom prst="rect">
+            <a:avLst/>
+          </a:prstGeom>
+        </p:spPr>
+        <p:txBody>
+          <a:bodyPr wrap="none">
+            <a:spAutoFit/>
+          </a:bodyPr>
+          <a:lstStyle/>
+          <a:p>
+            <a:r>
+              <a:rPr lang="en-US">
+                <a:hlinkClick r:id="rId3"/>
+              </a:rPr>
+              <a:t>https://en.wikipedia.org/wiki/Word_embedding</a:t>
+            </a:r>
+            <a:endParaRPr lang="en-US" dirty="0"/>
+          </a:p>
+        </p:txBody>
+      </p:sp>
+    </p:spTree>
+    <p:extLst>
+      <p:ext uri="{BB962C8B-B14F-4D97-AF65-F5344CB8AC3E}">
+        <p14:creationId xmlns:p14="http://schemas.microsoft.com/office/powerpoint/2010/main" val="478961106"/>
+      </p:ext>
+    </p:extLst>
+  </p:cSld>
+  <p:clrMapOvr>
+    <a:masterClrMapping/>
+  </p:clrMapOvr>
+</p:sld>
+</file>
+
+<file path=ppt/slides/slide14.xml><?xml version="1.0" encoding="utf-8"?>
+<p:sld xmlns:a="http://schemas.openxmlformats.org/drawingml/2006/main" xmlns:r="http://schemas.openxmlformats.org/officeDocument/2006/relationships" xmlns:p="http://schemas.openxmlformats.org/presentationml/2006/main">
+  <p:cSld>
+    <p:spTree>
+      <p:nvGrpSpPr>
+        <p:cNvPr id="1" name=""/>
+        <p:cNvGrpSpPr/>
+        <p:nvPr/>
+      </p:nvGrpSpPr>
+      <p:grpSpPr>
+        <a:xfrm>
+          <a:off x="0" y="0"/>
+          <a:ext cx="0" cy="0"/>
+          <a:chOff x="0" y="0"/>
+          <a:chExt cx="0" cy="0"/>
+        </a:xfrm>
+      </p:grpSpPr>
+      <p:pic>
+        <p:nvPicPr>
+          <p:cNvPr id="4" name="Picture 4" descr="Image result for featurized presentation word embedding andrew ng">
+            <a:extLst>
+              <a:ext uri="{FF2B5EF4-FFF2-40B4-BE49-F238E27FC236}">
+                <a16:creationId xmlns:a16="http://schemas.microsoft.com/office/drawing/2014/main" id="{572BA9DA-5519-4FF6-8366-A5AC2FCEBDB4}"/>
+              </a:ext>
+            </a:extLst>
+          </p:cNvPr>
+          <p:cNvPicPr>
+            <a:picLocks noChangeAspect="1" noChangeArrowheads="1"/>
+          </p:cNvPicPr>
+          <p:nvPr/>
+        </p:nvPicPr>
+        <p:blipFill>
+          <a:blip r:embed="rId2">
+            <a:extLst>
+              <a:ext uri="{28A0092B-C50C-407E-A947-70E740481C1C}">
+                <a14:useLocalDpi xmlns:a14="http://schemas.microsoft.com/office/drawing/2010/main" val="0"/>
+              </a:ext>
+            </a:extLst>
+          </a:blip>
+          <a:srcRect/>
+          <a:stretch>
+            <a:fillRect/>
+          </a:stretch>
+        </p:blipFill>
+        <p:spPr bwMode="auto">
+          <a:xfrm>
+            <a:off x="2427702" y="2926992"/>
+            <a:ext cx="7336596" cy="3565883"/>
+          </a:xfrm>
+          <a:prstGeom prst="rect">
+            <a:avLst/>
+          </a:prstGeom>
+          <a:noFill/>
+          <a:extLst>
+            <a:ext uri="{909E8E84-426E-40DD-AFC4-6F175D3DCCD1}">
+              <a14:hiddenFill xmlns:a14="http://schemas.microsoft.com/office/drawing/2010/main">
+                <a:solidFill>
+                  <a:srgbClr val="FFFFFF"/>
+                </a:solidFill>
+              </a14:hiddenFill>
+            </a:ext>
+          </a:extLst>
+        </p:spPr>
+      </p:pic>
+      <p:sp>
+        <p:nvSpPr>
+          <p:cNvPr id="2" name="Title 1">
+            <a:extLst>
+              <a:ext uri="{FF2B5EF4-FFF2-40B4-BE49-F238E27FC236}">
+                <a16:creationId xmlns:a16="http://schemas.microsoft.com/office/drawing/2014/main" id="{D382CF4C-58E5-411C-BDAF-B95659F4009D}"/>
+              </a:ext>
+            </a:extLst>
+          </p:cNvPr>
+          <p:cNvSpPr>
+            <a:spLocks noGrp="1"/>
+          </p:cNvSpPr>
+          <p:nvPr>
+            <p:ph type="title"/>
+          </p:nvPr>
+        </p:nvSpPr>
+        <p:spPr/>
+        <p:txBody>
+          <a:bodyPr/>
+          <a:lstStyle/>
+          <a:p>
+            <a:r>
+              <a:rPr lang="en-US" b="1" dirty="0"/>
+              <a:t>Word Embeddings</a:t>
+            </a:r>
+            <a:endParaRPr lang="en-US" dirty="0"/>
+          </a:p>
+        </p:txBody>
+      </p:sp>
+      <p:sp>
+        <p:nvSpPr>
+          <p:cNvPr id="3" name="Content Placeholder 2">
+            <a:extLst>
+              <a:ext uri="{FF2B5EF4-FFF2-40B4-BE49-F238E27FC236}">
+                <a16:creationId xmlns:a16="http://schemas.microsoft.com/office/drawing/2014/main" id="{FEF61004-E796-451B-B52A-189A653B9304}"/>
+              </a:ext>
+            </a:extLst>
+          </p:cNvPr>
+          <p:cNvSpPr>
+            <a:spLocks noGrp="1"/>
+          </p:cNvSpPr>
+          <p:nvPr>
+            <p:ph idx="1"/>
+          </p:nvPr>
+        </p:nvSpPr>
+        <p:spPr/>
+        <p:txBody>
+          <a:bodyPr/>
+          <a:lstStyle/>
+          <a:p>
+            <a:r>
+              <a:rPr lang="en-US" dirty="0"/>
+              <a:t>Instead of dictionary definition, we can image that each word has its own attributes in this “space of meaning”.</a:t>
+            </a:r>
+          </a:p>
+          <a:p>
+            <a:r>
+              <a:rPr lang="en-US" dirty="0"/>
+              <a:t>For example:</a:t>
+            </a:r>
+          </a:p>
+        </p:txBody>
+      </p:sp>
+    </p:spTree>
+    <p:extLst>
+      <p:ext uri="{BB962C8B-B14F-4D97-AF65-F5344CB8AC3E}">
+        <p14:creationId xmlns:p14="http://schemas.microsoft.com/office/powerpoint/2010/main" val="2031619664"/>
+      </p:ext>
+    </p:extLst>
+  </p:cSld>
+  <p:clrMapOvr>
+    <a:masterClrMapping/>
+  </p:clrMapOvr>
+</p:sld>
+</file>
+
+<file path=ppt/slides/slide15.xml><?xml version="1.0" encoding="utf-8"?>
+<p:sld xmlns:a="http://schemas.openxmlformats.org/drawingml/2006/main" xmlns:r="http://schemas.openxmlformats.org/officeDocument/2006/relationships" xmlns:p="http://schemas.openxmlformats.org/presentationml/2006/main">
+  <p:cSld>
+    <p:spTree>
+      <p:nvGrpSpPr>
+        <p:cNvPr id="1" name=""/>
+        <p:cNvGrpSpPr/>
+        <p:nvPr/>
+      </p:nvGrpSpPr>
+      <p:grpSpPr>
+        <a:xfrm>
+          <a:off x="0" y="0"/>
+          <a:ext cx="0" cy="0"/>
+          <a:chOff x="0" y="0"/>
+          <a:chExt cx="0" cy="0"/>
+        </a:xfrm>
+      </p:grpSpPr>
+      <p:pic>
+        <p:nvPicPr>
+          <p:cNvPr id="1026" name="Picture 2" descr="Image result for word2vec">
+            <a:extLst>
+              <a:ext uri="{FF2B5EF4-FFF2-40B4-BE49-F238E27FC236}">
+                <a16:creationId xmlns:a16="http://schemas.microsoft.com/office/drawing/2014/main" id="{E8D94B78-721F-424D-B4C9-3D09183185F7}"/>
+              </a:ext>
+            </a:extLst>
+          </p:cNvPr>
+          <p:cNvPicPr>
+            <a:picLocks noChangeAspect="1" noChangeArrowheads="1"/>
+          </p:cNvPicPr>
+          <p:nvPr/>
+        </p:nvPicPr>
+        <p:blipFill>
+          <a:blip r:embed="rId2">
+            <a:extLst>
+              <a:ext uri="{28A0092B-C50C-407E-A947-70E740481C1C}">
+                <a14:useLocalDpi xmlns:a14="http://schemas.microsoft.com/office/drawing/2010/main" val="0"/>
+              </a:ext>
+            </a:extLst>
+          </a:blip>
+          <a:srcRect/>
+          <a:stretch>
+            <a:fillRect/>
+          </a:stretch>
+        </p:blipFill>
+        <p:spPr bwMode="auto">
+          <a:xfrm>
+            <a:off x="7242785" y="2499485"/>
+            <a:ext cx="4949215" cy="4246412"/>
+          </a:xfrm>
+          <a:prstGeom prst="rect">
+            <a:avLst/>
+          </a:prstGeom>
+          <a:noFill/>
+          <a:extLst>
+            <a:ext uri="{909E8E84-426E-40DD-AFC4-6F175D3DCCD1}">
+              <a14:hiddenFill xmlns:a14="http://schemas.microsoft.com/office/drawing/2010/main">
+                <a:solidFill>
+                  <a:srgbClr val="FFFFFF"/>
+                </a:solidFill>
+              </a14:hiddenFill>
+            </a:ext>
+          </a:extLst>
+        </p:spPr>
+      </p:pic>
+      <p:sp>
+        <p:nvSpPr>
+          <p:cNvPr id="2" name="Title 1">
+            <a:extLst>
+              <a:ext uri="{FF2B5EF4-FFF2-40B4-BE49-F238E27FC236}">
+                <a16:creationId xmlns:a16="http://schemas.microsoft.com/office/drawing/2014/main" id="{D382CF4C-58E5-411C-BDAF-B95659F4009D}"/>
+              </a:ext>
+            </a:extLst>
+          </p:cNvPr>
+          <p:cNvSpPr>
+            <a:spLocks noGrp="1"/>
+          </p:cNvSpPr>
+          <p:nvPr>
+            <p:ph type="title"/>
+          </p:nvPr>
+        </p:nvSpPr>
+        <p:spPr/>
+        <p:txBody>
+          <a:bodyPr/>
+          <a:lstStyle/>
+          <a:p>
+            <a:r>
+              <a:rPr lang="en-US" b="1" dirty="0">
+                <a:effectLst>
+                  <a:outerShdw blurRad="38100" dist="38100" dir="2700000" algn="tl">
+                    <a:srgbClr val="000000">
+                      <a:alpha val="43137"/>
+                    </a:srgbClr>
+                  </a:outerShdw>
+                </a:effectLst>
+              </a:rPr>
+              <a:t>Creating Word Embeddings</a:t>
+            </a:r>
+            <a:endParaRPr lang="en-US" dirty="0"/>
+          </a:p>
+        </p:txBody>
+      </p:sp>
+      <p:sp>
+        <p:nvSpPr>
+          <p:cNvPr id="3" name="Content Placeholder 2">
+            <a:extLst>
+              <a:ext uri="{FF2B5EF4-FFF2-40B4-BE49-F238E27FC236}">
+                <a16:creationId xmlns:a16="http://schemas.microsoft.com/office/drawing/2014/main" id="{FEF61004-E796-451B-B52A-189A653B9304}"/>
+              </a:ext>
+            </a:extLst>
+          </p:cNvPr>
+          <p:cNvSpPr>
+            <a:spLocks noGrp="1"/>
+          </p:cNvSpPr>
+          <p:nvPr>
+            <p:ph idx="1"/>
+          </p:nvPr>
+        </p:nvSpPr>
+        <p:spPr>
+          <a:xfrm>
+            <a:off x="838200" y="1825625"/>
+            <a:ext cx="10991127" cy="4351338"/>
+          </a:xfrm>
+        </p:spPr>
+        <p:txBody>
+          <a:bodyPr/>
+          <a:lstStyle/>
+          <a:p>
+            <a:r>
+              <a:rPr lang="en-US" dirty="0"/>
+              <a:t>We can ask human experts to derive word embedding, but this task is exhausting for human and the process can be highly subjective.</a:t>
+            </a:r>
+          </a:p>
+        </p:txBody>
+      </p:sp>
+      <p:sp>
+        <p:nvSpPr>
+          <p:cNvPr id="5" name="Rectangle 4">
+            <a:extLst>
+              <a:ext uri="{FF2B5EF4-FFF2-40B4-BE49-F238E27FC236}">
+                <a16:creationId xmlns:a16="http://schemas.microsoft.com/office/drawing/2014/main" id="{C61F38FB-AA17-40B0-A23D-653B7E5BBA01}"/>
+              </a:ext>
+            </a:extLst>
+          </p:cNvPr>
+          <p:cNvSpPr/>
+          <p:nvPr/>
+        </p:nvSpPr>
+        <p:spPr>
+          <a:xfrm>
+            <a:off x="838200" y="3068420"/>
+            <a:ext cx="6687207" cy="3108543"/>
+          </a:xfrm>
+          <a:prstGeom prst="rect">
+            <a:avLst/>
+          </a:prstGeom>
+        </p:spPr>
+        <p:txBody>
+          <a:bodyPr wrap="square">
+            <a:spAutoFit/>
+          </a:bodyPr>
+          <a:lstStyle/>
+          <a:p>
+            <a:pPr marL="285750" indent="-285750">
+              <a:buFont typeface="Arial" panose="020B0604020202020204" pitchFamily="34" charset="0"/>
+              <a:buChar char="•"/>
+            </a:pPr>
+            <a:r>
+              <a:rPr lang="en-US" sz="2800" dirty="0"/>
+              <a:t>Alternatively, we can do it with </a:t>
+            </a:r>
+            <a:r>
+              <a:rPr lang="en-US" sz="2800" b="1" dirty="0"/>
+              <a:t>algorithm</a:t>
+            </a:r>
+            <a:r>
+              <a:rPr lang="en-US" sz="2800" dirty="0"/>
+              <a:t> and a </a:t>
+            </a:r>
+            <a:r>
+              <a:rPr lang="en-US" sz="2800" b="1" dirty="0"/>
+              <a:t>large corpus</a:t>
+            </a:r>
+          </a:p>
+          <a:p>
+            <a:pPr marL="742950" lvl="1" indent="-285750">
+              <a:buFont typeface="Arial" panose="020B0604020202020204" pitchFamily="34" charset="0"/>
+              <a:buChar char="•"/>
+            </a:pPr>
+            <a:r>
+              <a:rPr lang="en-US" sz="2800" dirty="0"/>
+              <a:t>Bag-of-Words (BOW)</a:t>
+            </a:r>
+          </a:p>
+          <a:p>
+            <a:pPr marL="742950" lvl="1" indent="-285750">
+              <a:buFont typeface="Arial" panose="020B0604020202020204" pitchFamily="34" charset="0"/>
+              <a:buChar char="•"/>
+            </a:pPr>
+            <a:r>
+              <a:rPr lang="en-US" sz="2800" dirty="0"/>
+              <a:t>word2vec</a:t>
+            </a:r>
+          </a:p>
+          <a:p>
+            <a:pPr marL="742950" lvl="1" indent="-285750">
+              <a:buFont typeface="Arial" panose="020B0604020202020204" pitchFamily="34" charset="0"/>
+              <a:buChar char="•"/>
+            </a:pPr>
+            <a:r>
+              <a:rPr lang="en-US" sz="2800" dirty="0" err="1"/>
+              <a:t>GloVe</a:t>
+            </a:r>
+            <a:endParaRPr lang="en-US" sz="2800" dirty="0"/>
+          </a:p>
+          <a:p>
+            <a:pPr marL="742950" lvl="1" indent="-285750">
+              <a:buFont typeface="Arial" panose="020B0604020202020204" pitchFamily="34" charset="0"/>
+              <a:buChar char="•"/>
+            </a:pPr>
+            <a:r>
+              <a:rPr lang="en-US" sz="2800" dirty="0" err="1"/>
+              <a:t>fastText</a:t>
+            </a:r>
+            <a:endParaRPr lang="en-US" sz="2800" dirty="0"/>
+          </a:p>
+          <a:p>
+            <a:pPr marL="742950" lvl="1" indent="-285750">
+              <a:buFont typeface="Arial" panose="020B0604020202020204" pitchFamily="34" charset="0"/>
+              <a:buChar char="•"/>
+            </a:pPr>
+            <a:r>
+              <a:rPr lang="en-US" sz="2800" dirty="0"/>
+              <a:t>…</a:t>
+            </a:r>
+          </a:p>
+        </p:txBody>
+      </p:sp>
+    </p:spTree>
+    <p:extLst>
+      <p:ext uri="{BB962C8B-B14F-4D97-AF65-F5344CB8AC3E}">
+        <p14:creationId xmlns:p14="http://schemas.microsoft.com/office/powerpoint/2010/main" val="2828395302"/>
+      </p:ext>
+    </p:extLst>
+  </p:cSld>
+  <p:clrMapOvr>
+    <a:masterClrMapping/>
+  </p:clrMapOvr>
+</p:sld>
+</file>
+
+<file path=ppt/slides/slide16.xml><?xml version="1.0" encoding="utf-8"?>
+<p:sld xmlns:a="http://schemas.openxmlformats.org/drawingml/2006/main" xmlns:r="http://schemas.openxmlformats.org/officeDocument/2006/relationships" xmlns:p="http://schemas.openxmlformats.org/presentationml/2006/main">
+  <p:cSld>
+    <p:spTree>
+      <p:nvGrpSpPr>
+        <p:cNvPr id="1" name=""/>
+        <p:cNvGrpSpPr/>
+        <p:nvPr/>
+      </p:nvGrpSpPr>
+      <p:grpSpPr>
+        <a:xfrm>
+          <a:off x="0" y="0"/>
+          <a:ext cx="0" cy="0"/>
+          <a:chOff x="0" y="0"/>
+          <a:chExt cx="0" cy="0"/>
+        </a:xfrm>
+      </p:grpSpPr>
+      <p:sp>
+        <p:nvSpPr>
+          <p:cNvPr id="2" name="Title 1">
+            <a:extLst>
+              <a:ext uri="{FF2B5EF4-FFF2-40B4-BE49-F238E27FC236}">
+                <a16:creationId xmlns:a16="http://schemas.microsoft.com/office/drawing/2014/main" id="{0BDB91E8-E829-4EBB-8C92-DED148C9AF7B}"/>
+              </a:ext>
+            </a:extLst>
+          </p:cNvPr>
+          <p:cNvSpPr>
+            <a:spLocks noGrp="1"/>
+          </p:cNvSpPr>
+          <p:nvPr>
+            <p:ph type="title"/>
+          </p:nvPr>
+        </p:nvSpPr>
+        <p:spPr/>
+        <p:txBody>
+          <a:bodyPr/>
+          <a:lstStyle/>
+          <a:p>
+            <a:r>
+              <a:rPr lang="en-US" b="1" dirty="0">
+                <a:effectLst>
+                  <a:outerShdw blurRad="38100" dist="38100" dir="2700000" algn="tl">
+                    <a:srgbClr val="000000">
+                      <a:alpha val="43137"/>
+                    </a:srgbClr>
+                  </a:outerShdw>
+                </a:effectLst>
+              </a:rPr>
+              <a:t>Why Do We Quantify Words?</a:t>
+            </a:r>
+            <a:endParaRPr lang="en-US" dirty="0"/>
+          </a:p>
+        </p:txBody>
+      </p:sp>
+      <p:sp>
+        <p:nvSpPr>
+          <p:cNvPr id="3" name="Content Placeholder 2">
+            <a:extLst>
+              <a:ext uri="{FF2B5EF4-FFF2-40B4-BE49-F238E27FC236}">
+                <a16:creationId xmlns:a16="http://schemas.microsoft.com/office/drawing/2014/main" id="{D7F21907-CCC0-4F4B-B217-52931287EEBE}"/>
+              </a:ext>
+            </a:extLst>
+          </p:cNvPr>
+          <p:cNvSpPr>
+            <a:spLocks noGrp="1"/>
+          </p:cNvSpPr>
+          <p:nvPr>
+            <p:ph idx="1"/>
+          </p:nvPr>
+        </p:nvSpPr>
+        <p:spPr/>
+        <p:txBody>
+          <a:bodyPr/>
+          <a:lstStyle/>
+          <a:p>
+            <a:r>
+              <a:rPr lang="en-US" dirty="0"/>
+              <a:t>Once words become vectors, we can easily derive:</a:t>
+            </a:r>
+          </a:p>
+          <a:p>
+            <a:pPr lvl="1"/>
+            <a:r>
+              <a:rPr lang="en-US" b="1" dirty="0"/>
+              <a:t>Similarity</a:t>
+            </a:r>
+            <a:r>
+              <a:rPr lang="en-US" dirty="0"/>
+              <a:t> between words, phrases, sentences, and paragraphs</a:t>
+            </a:r>
+          </a:p>
+          <a:p>
+            <a:pPr lvl="1"/>
+            <a:r>
+              <a:rPr lang="en-US" b="1" dirty="0"/>
+              <a:t>Latent variables</a:t>
+            </a:r>
+            <a:r>
+              <a:rPr lang="en-US" dirty="0"/>
+              <a:t> behind a corpus</a:t>
+            </a:r>
+          </a:p>
+          <a:p>
+            <a:pPr lvl="1"/>
+            <a:r>
+              <a:rPr lang="en-US" dirty="0"/>
+              <a:t>Other quantitative analysis</a:t>
+            </a:r>
+          </a:p>
+          <a:p>
+            <a:pPr lvl="1"/>
+            <a:endParaRPr lang="en-US" dirty="0"/>
+          </a:p>
+          <a:p>
+            <a:r>
+              <a:rPr lang="en-US" dirty="0"/>
+              <a:t>And based on these analysis, we can do:</a:t>
+            </a:r>
+          </a:p>
+          <a:p>
+            <a:pPr lvl="1"/>
+            <a:r>
+              <a:rPr lang="en-US" dirty="0"/>
+              <a:t>Machine translation</a:t>
+            </a:r>
+          </a:p>
+          <a:p>
+            <a:pPr lvl="1"/>
+            <a:r>
+              <a:rPr lang="en-US" dirty="0"/>
+              <a:t>Text classification</a:t>
+            </a:r>
+          </a:p>
+          <a:p>
+            <a:pPr lvl="1"/>
+            <a:r>
+              <a:rPr lang="en-US" dirty="0"/>
+              <a:t>Document summarization</a:t>
+            </a:r>
+          </a:p>
+          <a:p>
+            <a:pPr lvl="1"/>
+            <a:r>
+              <a:rPr lang="en-US" sz="2000" dirty="0"/>
+              <a:t>And eventually, </a:t>
+            </a:r>
+            <a:r>
+              <a:rPr lang="en-US" sz="2000" b="1" dirty="0"/>
+              <a:t>natural language understanding</a:t>
+            </a:r>
+            <a:endParaRPr lang="en-US" b="1" dirty="0"/>
+          </a:p>
+        </p:txBody>
+      </p:sp>
+      <p:pic>
+        <p:nvPicPr>
+          <p:cNvPr id="4" name="Picture 2" descr="Image result for word embedding">
+            <a:extLst>
+              <a:ext uri="{FF2B5EF4-FFF2-40B4-BE49-F238E27FC236}">
+                <a16:creationId xmlns:a16="http://schemas.microsoft.com/office/drawing/2014/main" id="{6CC29508-7F0B-462D-9BF3-5FC572EBC5D4}"/>
+              </a:ext>
+            </a:extLst>
+          </p:cNvPr>
+          <p:cNvPicPr>
+            <a:picLocks noChangeAspect="1" noChangeArrowheads="1"/>
+          </p:cNvPicPr>
+          <p:nvPr/>
+        </p:nvPicPr>
+        <p:blipFill>
+          <a:blip r:embed="rId2">
+            <a:extLst>
+              <a:ext uri="{28A0092B-C50C-407E-A947-70E740481C1C}">
+                <a14:useLocalDpi xmlns:a14="http://schemas.microsoft.com/office/drawing/2010/main" val="0"/>
+              </a:ext>
+            </a:extLst>
+          </a:blip>
+          <a:srcRect/>
+          <a:stretch>
+            <a:fillRect/>
+          </a:stretch>
+        </p:blipFill>
+        <p:spPr bwMode="auto">
+          <a:xfrm>
+            <a:off x="6857460" y="2939598"/>
+            <a:ext cx="4496340" cy="3237365"/>
+          </a:xfrm>
+          <a:prstGeom prst="rect">
+            <a:avLst/>
+          </a:prstGeom>
+          <a:noFill/>
+          <a:extLst>
+            <a:ext uri="{909E8E84-426E-40DD-AFC4-6F175D3DCCD1}">
+              <a14:hiddenFill xmlns:a14="http://schemas.microsoft.com/office/drawing/2010/main">
+                <a:solidFill>
+                  <a:srgbClr val="FFFFFF"/>
+                </a:solidFill>
+              </a14:hiddenFill>
+            </a:ext>
+          </a:extLst>
+        </p:spPr>
+      </p:pic>
+    </p:spTree>
+    <p:extLst>
+      <p:ext uri="{BB962C8B-B14F-4D97-AF65-F5344CB8AC3E}">
+        <p14:creationId xmlns:p14="http://schemas.microsoft.com/office/powerpoint/2010/main" val="2421316809"/>
+      </p:ext>
+    </p:extLst>
+  </p:cSld>
+  <p:clrMapOvr>
+    <a:masterClrMapping/>
+  </p:clrMapOvr>
+</p:sld>
+</file>
+
+<file path=ppt/slides/slide17.xml><?xml version="1.0" encoding="utf-8"?>
+<p:sld xmlns:a="http://schemas.openxmlformats.org/drawingml/2006/main" xmlns:r="http://schemas.openxmlformats.org/officeDocument/2006/relationships" xmlns:p="http://schemas.openxmlformats.org/presentationml/2006/main">
+  <p:cSld>
+    <p:spTree>
+      <p:nvGrpSpPr>
+        <p:cNvPr id="1" name=""/>
+        <p:cNvGrpSpPr/>
+        <p:nvPr/>
+      </p:nvGrpSpPr>
+      <p:grpSpPr>
+        <a:xfrm>
+          <a:off x="0" y="0"/>
+          <a:ext cx="0" cy="0"/>
+          <a:chOff x="0" y="0"/>
+          <a:chExt cx="0" cy="0"/>
+        </a:xfrm>
+      </p:grpSpPr>
+      <p:sp>
+        <p:nvSpPr>
+          <p:cNvPr id="2" name="Title 1">
+            <a:extLst>
+              <a:ext uri="{FF2B5EF4-FFF2-40B4-BE49-F238E27FC236}">
                 <a16:creationId xmlns:a16="http://schemas.microsoft.com/office/drawing/2014/main" id="{BD21AC21-2D7B-46CE-820F-64F44F6C1909}"/>
               </a:ext>
             </a:extLst>
@@ -3901,7 +5423,7 @@
           <a:p>
             <a:r>
               <a:rPr lang="en-US" b="1" dirty="0"/>
-              <a:t>Why Do We Need Latent Variables?</a:t>
+              <a:t>Another Purpose of Latent Variables</a:t>
             </a:r>
           </a:p>
         </p:txBody>
@@ -4013,7 +5535,7 @@
 </p:sld>
 </file>
 
-<file path=ppt/slides/slide11.xml><?xml version="1.0" encoding="utf-8"?>
+<file path=ppt/slides/slide18.xml><?xml version="1.0" encoding="utf-8"?>
 <p:sld xmlns:a="http://schemas.openxmlformats.org/drawingml/2006/main" xmlns:r="http://schemas.openxmlformats.org/officeDocument/2006/relationships" xmlns:p="http://schemas.openxmlformats.org/presentationml/2006/main">
   <p:cSld>
     <p:spTree>
@@ -5680,6 +7202,123 @@
 <file path=ppt/slides/slide6.xml><?xml version="1.0" encoding="utf-8"?>
 <p:sld xmlns:a="http://schemas.openxmlformats.org/drawingml/2006/main" xmlns:r="http://schemas.openxmlformats.org/officeDocument/2006/relationships" xmlns:p="http://schemas.openxmlformats.org/presentationml/2006/main">
   <p:cSld>
+    <p:spTree>
+      <p:nvGrpSpPr>
+        <p:cNvPr id="1" name=""/>
+        <p:cNvGrpSpPr/>
+        <p:nvPr/>
+      </p:nvGrpSpPr>
+      <p:grpSpPr>
+        <a:xfrm>
+          <a:off x="0" y="0"/>
+          <a:ext cx="0" cy="0"/>
+          <a:chOff x="0" y="0"/>
+          <a:chExt cx="0" cy="0"/>
+        </a:xfrm>
+      </p:grpSpPr>
+      <p:sp>
+        <p:nvSpPr>
+          <p:cNvPr id="2" name="Title 1">
+            <a:extLst>
+              <a:ext uri="{FF2B5EF4-FFF2-40B4-BE49-F238E27FC236}">
+                <a16:creationId xmlns:a16="http://schemas.microsoft.com/office/drawing/2014/main" id="{A2494A2C-DD87-4BD9-855E-BB52B1325150}"/>
+              </a:ext>
+            </a:extLst>
+          </p:cNvPr>
+          <p:cNvSpPr>
+            <a:spLocks noGrp="1"/>
+          </p:cNvSpPr>
+          <p:nvPr>
+            <p:ph type="title"/>
+          </p:nvPr>
+        </p:nvSpPr>
+        <p:spPr/>
+        <p:txBody>
+          <a:bodyPr/>
+          <a:lstStyle/>
+          <a:p>
+            <a:r>
+              <a:rPr lang="en-US" b="1" dirty="0"/>
+              <a:t>Big Five </a:t>
+            </a:r>
+            <a:r>
+              <a:rPr lang="en-US" b="1" dirty="0" err="1"/>
+              <a:t>Questionaires</a:t>
+            </a:r>
+            <a:endParaRPr lang="en-US" b="1" dirty="0"/>
+          </a:p>
+        </p:txBody>
+      </p:sp>
+      <p:pic>
+        <p:nvPicPr>
+          <p:cNvPr id="4" name="Content Placeholder 3">
+            <a:extLst>
+              <a:ext uri="{FF2B5EF4-FFF2-40B4-BE49-F238E27FC236}">
+                <a16:creationId xmlns:a16="http://schemas.microsoft.com/office/drawing/2014/main" id="{BFFF1DE5-006E-430D-A6A6-AE78D2039F67}"/>
+              </a:ext>
+            </a:extLst>
+          </p:cNvPr>
+          <p:cNvPicPr>
+            <a:picLocks noGrp="1" noChangeAspect="1"/>
+          </p:cNvPicPr>
+          <p:nvPr>
+            <p:ph idx="1"/>
+          </p:nvPr>
+        </p:nvPicPr>
+        <p:blipFill>
+          <a:blip r:embed="rId2">
+            <a:extLst>
+              <a:ext uri="{BEBA8EAE-BF5A-486C-A8C5-ECC9F3942E4B}">
+                <a14:imgProps xmlns:a14="http://schemas.microsoft.com/office/drawing/2010/main">
+                  <a14:imgLayer r:embed="rId3">
+                    <a14:imgEffect>
+                      <a14:colorTemperature colorTemp="7200"/>
+                    </a14:imgEffect>
+                  </a14:imgLayer>
+                </a14:imgProps>
+              </a:ext>
+            </a:extLst>
+          </a:blip>
+          <a:stretch>
+            <a:fillRect/>
+          </a:stretch>
+        </p:blipFill>
+        <p:spPr>
+          <a:xfrm>
+            <a:off x="1512042" y="1406193"/>
+            <a:ext cx="9167915" cy="5138637"/>
+          </a:xfrm>
+          <a:prstGeom prst="rect">
+            <a:avLst/>
+          </a:prstGeom>
+          <a:ln w="228600" cap="sq" cmpd="thickThin">
+            <a:noFill/>
+            <a:prstDash val="solid"/>
+            <a:miter lim="800000"/>
+          </a:ln>
+          <a:effectLst>
+            <a:innerShdw blurRad="76200">
+              <a:srgbClr val="000000"/>
+            </a:innerShdw>
+          </a:effectLst>
+        </p:spPr>
+      </p:pic>
+    </p:spTree>
+    <p:extLst>
+      <p:ext uri="{BB962C8B-B14F-4D97-AF65-F5344CB8AC3E}">
+        <p14:creationId xmlns:p14="http://schemas.microsoft.com/office/powerpoint/2010/main" val="3558281485"/>
+      </p:ext>
+    </p:extLst>
+  </p:cSld>
+  <p:clrMapOvr>
+    <a:masterClrMapping/>
+  </p:clrMapOvr>
+</p:sld>
+</file>
+
+<file path=ppt/slides/slide7.xml><?xml version="1.0" encoding="utf-8"?>
+<p:sld xmlns:a="http://schemas.openxmlformats.org/drawingml/2006/main" xmlns:r="http://schemas.openxmlformats.org/officeDocument/2006/relationships" xmlns:p="http://schemas.openxmlformats.org/presentationml/2006/main">
+  <p:cSld>
     <p:bg>
       <p:bgPr>
         <a:solidFill>
@@ -5912,7 +7551,7 @@
 </p:sld>
 </file>
 
-<file path=ppt/slides/slide7.xml><?xml version="1.0" encoding="utf-8"?>
+<file path=ppt/slides/slide8.xml><?xml version="1.0" encoding="utf-8"?>
 <p:sld xmlns:a="http://schemas.openxmlformats.org/drawingml/2006/main" xmlns:r="http://schemas.openxmlformats.org/officeDocument/2006/relationships" xmlns:p="http://schemas.openxmlformats.org/presentationml/2006/main">
   <p:cSld>
     <p:spTree>
@@ -6065,255 +7704,6 @@
     <p:extLst>
       <p:ext uri="{BB962C8B-B14F-4D97-AF65-F5344CB8AC3E}">
         <p14:creationId xmlns:p14="http://schemas.microsoft.com/office/powerpoint/2010/main" val="4183547116"/>
-      </p:ext>
-    </p:extLst>
-  </p:cSld>
-  <p:clrMapOvr>
-    <a:masterClrMapping/>
-  </p:clrMapOvr>
-</p:sld>
-</file>
-
-<file path=ppt/slides/slide8.xml><?xml version="1.0" encoding="utf-8"?>
-<p:sld xmlns:a="http://schemas.openxmlformats.org/drawingml/2006/main" xmlns:r="http://schemas.openxmlformats.org/officeDocument/2006/relationships" xmlns:p="http://schemas.openxmlformats.org/presentationml/2006/main">
-  <p:cSld>
-    <p:spTree>
-      <p:nvGrpSpPr>
-        <p:cNvPr id="1" name=""/>
-        <p:cNvGrpSpPr/>
-        <p:nvPr/>
-      </p:nvGrpSpPr>
-      <p:grpSpPr>
-        <a:xfrm>
-          <a:off x="0" y="0"/>
-          <a:ext cx="0" cy="0"/>
-          <a:chOff x="0" y="0"/>
-          <a:chExt cx="0" cy="0"/>
-        </a:xfrm>
-      </p:grpSpPr>
-      <p:sp>
-        <p:nvSpPr>
-          <p:cNvPr id="2" name="Title 1">
-            <a:extLst>
-              <a:ext uri="{FF2B5EF4-FFF2-40B4-BE49-F238E27FC236}">
-                <a16:creationId xmlns:a16="http://schemas.microsoft.com/office/drawing/2014/main" id="{C5D465AA-458E-4072-A1C5-B5C67E370172}"/>
-              </a:ext>
-            </a:extLst>
-          </p:cNvPr>
-          <p:cNvSpPr>
-            <a:spLocks noGrp="1"/>
-          </p:cNvSpPr>
-          <p:nvPr>
-            <p:ph type="title"/>
-          </p:nvPr>
-        </p:nvSpPr>
-        <p:spPr/>
-        <p:txBody>
-          <a:bodyPr/>
-          <a:lstStyle/>
-          <a:p>
-            <a:r>
-              <a:rPr lang="en-US" b="1" dirty="0"/>
-              <a:t>Example: Geochemical Exploration</a:t>
-            </a:r>
-          </a:p>
-        </p:txBody>
-      </p:sp>
-      <p:sp>
-        <p:nvSpPr>
-          <p:cNvPr id="3" name="Content Placeholder 2">
-            <a:extLst>
-              <a:ext uri="{FF2B5EF4-FFF2-40B4-BE49-F238E27FC236}">
-                <a16:creationId xmlns:a16="http://schemas.microsoft.com/office/drawing/2014/main" id="{533A18BF-9BBB-4432-A224-9C9EE3411825}"/>
-              </a:ext>
-            </a:extLst>
-          </p:cNvPr>
-          <p:cNvSpPr>
-            <a:spLocks noGrp="1"/>
-          </p:cNvSpPr>
-          <p:nvPr>
-            <p:ph idx="1"/>
-          </p:nvPr>
-        </p:nvSpPr>
-        <p:spPr>
-          <a:xfrm>
-            <a:off x="838200" y="1825625"/>
-            <a:ext cx="5257800" cy="4351338"/>
-          </a:xfrm>
-        </p:spPr>
-        <p:txBody>
-          <a:bodyPr>
-            <a:normAutofit/>
-          </a:bodyPr>
-          <a:lstStyle/>
-          <a:p>
-            <a:r>
-              <a:rPr lang="en-US" b="0" i="0" u="sng" dirty="0">
-                <a:solidFill>
-                  <a:srgbClr val="0088CC"/>
-                </a:solidFill>
-                <a:effectLst/>
-                <a:hlinkClick r:id="rId2"/>
-              </a:rPr>
-              <a:t>Vijay </a:t>
-            </a:r>
-            <a:r>
-              <a:rPr lang="en-US" b="0" i="0" u="sng" dirty="0" err="1">
-                <a:solidFill>
-                  <a:srgbClr val="0088CC"/>
-                </a:solidFill>
-                <a:effectLst/>
-                <a:hlinkClick r:id="rId2"/>
-              </a:rPr>
-              <a:t>S.Tripathi</a:t>
-            </a:r>
-            <a:r>
-              <a:rPr lang="en-US" b="0" i="0" u="sng" dirty="0">
-                <a:solidFill>
-                  <a:srgbClr val="0088CC"/>
-                </a:solidFill>
-                <a:effectLst/>
-                <a:hlinkClick r:id="rId2"/>
-              </a:rPr>
-              <a:t> (1979)</a:t>
-            </a:r>
-            <a:r>
-              <a:rPr lang="en-US" b="0" i="0" dirty="0">
-                <a:solidFill>
-                  <a:srgbClr val="000000"/>
-                </a:solidFill>
-                <a:effectLst/>
-              </a:rPr>
-              <a:t> applied </a:t>
-            </a:r>
-            <a:r>
-              <a:rPr lang="en-US" b="1" i="0" dirty="0">
-                <a:solidFill>
-                  <a:srgbClr val="000000"/>
-                </a:solidFill>
-                <a:effectLst/>
-              </a:rPr>
-              <a:t>factor analysis</a:t>
-            </a:r>
-            <a:r>
-              <a:rPr lang="en-US" b="0" i="0" dirty="0">
-                <a:solidFill>
-                  <a:srgbClr val="000000"/>
-                </a:solidFill>
-                <a:effectLst/>
-              </a:rPr>
-              <a:t> on the chemical compositions of soil samples (10 chemical elements) and derived 4 factors. Hunt and </a:t>
-            </a:r>
-            <a:r>
-              <a:rPr lang="en-US" b="0" i="0" dirty="0" err="1">
-                <a:solidFill>
-                  <a:srgbClr val="000000"/>
-                </a:solidFill>
-                <a:effectLst/>
-              </a:rPr>
-              <a:t>Gilkes</a:t>
-            </a:r>
-            <a:r>
-              <a:rPr lang="en-US" b="0" i="0" dirty="0">
-                <a:solidFill>
-                  <a:srgbClr val="000000"/>
-                </a:solidFill>
-                <a:effectLst/>
-              </a:rPr>
-              <a:t> (1992) used similar approach and resulted in a </a:t>
-            </a:r>
-            <a:r>
-              <a:rPr lang="en-US" b="0" i="1" dirty="0">
-                <a:solidFill>
-                  <a:srgbClr val="000000"/>
-                </a:solidFill>
-                <a:effectLst/>
-              </a:rPr>
-              <a:t>soil textural triangle</a:t>
-            </a:r>
-            <a:r>
-              <a:rPr lang="en-US" b="0" i="0" dirty="0">
-                <a:solidFill>
-                  <a:srgbClr val="000000"/>
-                </a:solidFill>
-                <a:effectLst/>
-              </a:rPr>
-              <a:t>. (further details in </a:t>
-            </a:r>
-            <a:r>
-              <a:rPr lang="en-US" b="0" i="0" u="sng" dirty="0">
-                <a:solidFill>
-                  <a:srgbClr val="0088CC"/>
-                </a:solidFill>
-                <a:effectLst/>
-                <a:hlinkClick r:id="rId3"/>
-              </a:rPr>
-              <a:t>Measuring Soil Texture in the Laboratory</a:t>
-            </a:r>
-            <a:r>
-              <a:rPr lang="en-US" b="0" i="0" dirty="0">
-                <a:solidFill>
-                  <a:srgbClr val="000000"/>
-                </a:solidFill>
-                <a:effectLst/>
-              </a:rPr>
-              <a:t>)</a:t>
-            </a:r>
-            <a:endParaRPr lang="en-US" dirty="0"/>
-          </a:p>
-        </p:txBody>
-      </p:sp>
-      <p:pic>
-        <p:nvPicPr>
-          <p:cNvPr id="5122" name="Picture 2">
-            <a:extLst>
-              <a:ext uri="{FF2B5EF4-FFF2-40B4-BE49-F238E27FC236}">
-                <a16:creationId xmlns:a16="http://schemas.microsoft.com/office/drawing/2014/main" id="{D1F477E3-3B9A-4B6A-9E47-A36055AD8F57}"/>
-              </a:ext>
-            </a:extLst>
-          </p:cNvPr>
-          <p:cNvPicPr>
-            <a:picLocks noChangeAspect="1" noChangeArrowheads="1"/>
-          </p:cNvPicPr>
-          <p:nvPr/>
-        </p:nvPicPr>
-        <p:blipFill>
-          <a:blip r:embed="rId4">
-            <a:extLst>
-              <a:ext uri="{28A0092B-C50C-407E-A947-70E740481C1C}">
-                <a14:useLocalDpi xmlns:a14="http://schemas.microsoft.com/office/drawing/2010/main" val="0"/>
-              </a:ext>
-            </a:extLst>
-          </a:blip>
-          <a:srcRect/>
-          <a:stretch>
-            <a:fillRect/>
-          </a:stretch>
-        </p:blipFill>
-        <p:spPr bwMode="auto">
-          <a:xfrm>
-            <a:off x="6243535" y="1690688"/>
-            <a:ext cx="5110265" cy="4486275"/>
-          </a:xfrm>
-          <a:prstGeom prst="rect">
-            <a:avLst/>
-          </a:prstGeom>
-          <a:noFill/>
-          <a:extLst>
-            <a:ext uri="{909E8E84-426E-40DD-AFC4-6F175D3DCCD1}">
-              <a14:hiddenFill xmlns:a14="http://schemas.microsoft.com/office/drawing/2010/main">
-                <a:solidFill>
-                  <a:srgbClr val="FFFFFF"/>
-                </a:solidFill>
-              </a14:hiddenFill>
-            </a:ext>
-          </a:extLst>
-        </p:spPr>
-      </p:pic>
-    </p:spTree>
-    <p:extLst>
-      <p:ext uri="{BB962C8B-B14F-4D97-AF65-F5344CB8AC3E}">
-        <p14:creationId xmlns:p14="http://schemas.microsoft.com/office/powerpoint/2010/main" val="1448174733"/>
       </p:ext>
     </p:extLst>
   </p:cSld>
@@ -6342,10 +7732,10 @@
       </p:grpSpPr>
       <p:pic>
         <p:nvPicPr>
-          <p:cNvPr id="6146" name="Picture 2" descr="Creating Word Embeddings: Coding the Word2Vec Algorithm in Python using  Deep Learning | by Eligijus Bujokas | Towards Data Science">
-            <a:extLst>
-              <a:ext uri="{FF2B5EF4-FFF2-40B4-BE49-F238E27FC236}">
-                <a16:creationId xmlns:a16="http://schemas.microsoft.com/office/drawing/2014/main" id="{FA060BCA-C8DF-4729-8F09-C017AE5EEC30}"/>
+          <p:cNvPr id="1028" name="Picture 4" descr="The Future of Corporate Real Estate: Quality of Life Matters">
+            <a:extLst>
+              <a:ext uri="{FF2B5EF4-FFF2-40B4-BE49-F238E27FC236}">
+                <a16:creationId xmlns:a16="http://schemas.microsoft.com/office/drawing/2014/main" id="{42793348-D01C-4891-B9B6-778700492B21}"/>
               </a:ext>
             </a:extLst>
           </p:cNvPr>
@@ -6369,8 +7759,8 @@
         </p:blipFill>
         <p:spPr bwMode="auto">
           <a:xfrm>
-            <a:off x="838200" y="2876529"/>
-            <a:ext cx="10515600" cy="3681829"/>
+            <a:off x="3048000" y="0"/>
+            <a:ext cx="9144000" cy="6858000"/>
           </a:xfrm>
           <a:prstGeom prst="rect">
             <a:avLst/>
@@ -6387,68 +7777,57 @@
           </a:extLst>
         </p:spPr>
       </p:pic>
-      <p:sp>
-        <p:nvSpPr>
-          <p:cNvPr id="2" name="Title 1">
-            <a:extLst>
-              <a:ext uri="{FF2B5EF4-FFF2-40B4-BE49-F238E27FC236}">
-                <a16:creationId xmlns:a16="http://schemas.microsoft.com/office/drawing/2014/main" id="{D3D9C1EC-7AF2-459E-8B29-A200F6BA10DE}"/>
-              </a:ext>
-            </a:extLst>
-          </p:cNvPr>
-          <p:cNvSpPr>
-            <a:spLocks noGrp="1"/>
-          </p:cNvSpPr>
-          <p:nvPr>
-            <p:ph type="title"/>
-          </p:nvPr>
-        </p:nvSpPr>
-        <p:spPr/>
-        <p:txBody>
-          <a:bodyPr/>
-          <a:lstStyle/>
-          <a:p>
-            <a:r>
-              <a:rPr lang="en-US" b="1" dirty="0"/>
-              <a:t>Example: Word Embedding</a:t>
-            </a:r>
-          </a:p>
-        </p:txBody>
-      </p:sp>
-      <p:sp>
-        <p:nvSpPr>
-          <p:cNvPr id="3" name="Content Placeholder 2">
-            <a:extLst>
-              <a:ext uri="{FF2B5EF4-FFF2-40B4-BE49-F238E27FC236}">
-                <a16:creationId xmlns:a16="http://schemas.microsoft.com/office/drawing/2014/main" id="{B68489C0-88E6-4DEC-8BB9-634EEDBC1B5A}"/>
-              </a:ext>
-            </a:extLst>
-          </p:cNvPr>
-          <p:cNvSpPr>
-            <a:spLocks noGrp="1"/>
-          </p:cNvSpPr>
-          <p:nvPr>
-            <p:ph idx="1"/>
-          </p:nvPr>
-        </p:nvSpPr>
-        <p:spPr/>
-        <p:txBody>
-          <a:bodyPr>
-            <a:normAutofit/>
-          </a:bodyPr>
-          <a:lstStyle/>
-          <a:p>
-            <a:r>
-              <a:rPr lang="en-US" sz="2400" dirty="0"/>
-              <a:t>Word embedding is the collective name for a set of language modeling and feature learning techniques in natural language processing (NLP) where words or phrases from the vocabulary are mapped to vectors of real numbers.</a:t>
-            </a:r>
-          </a:p>
-        </p:txBody>
-      </p:sp>
+      <p:pic>
+        <p:nvPicPr>
+          <p:cNvPr id="1030" name="Picture 6" descr="2011 Quality of Life Index | Nation Ranking">
+            <a:extLst>
+              <a:ext uri="{FF2B5EF4-FFF2-40B4-BE49-F238E27FC236}">
+                <a16:creationId xmlns:a16="http://schemas.microsoft.com/office/drawing/2014/main" id="{678A6A12-8024-4C8C-87F6-E97C01F32B3B}"/>
+              </a:ext>
+            </a:extLst>
+          </p:cNvPr>
+          <p:cNvPicPr>
+            <a:picLocks noChangeAspect="1" noChangeArrowheads="1"/>
+          </p:cNvPicPr>
+          <p:nvPr/>
+        </p:nvPicPr>
+        <p:blipFill>
+          <a:blip r:embed="rId3">
+            <a:extLst>
+              <a:ext uri="{28A0092B-C50C-407E-A947-70E740481C1C}">
+                <a14:useLocalDpi xmlns:a14="http://schemas.microsoft.com/office/drawing/2010/main" val="0"/>
+              </a:ext>
+            </a:extLst>
+          </a:blip>
+          <a:srcRect/>
+          <a:stretch>
+            <a:fillRect/>
+          </a:stretch>
+        </p:blipFill>
+        <p:spPr bwMode="auto">
+          <a:xfrm>
+            <a:off x="135356" y="731537"/>
+            <a:ext cx="4177241" cy="2196859"/>
+          </a:xfrm>
+          <a:prstGeom prst="rect">
+            <a:avLst/>
+          </a:prstGeom>
+          <a:noFill/>
+          <a:extLst>
+            <a:ext uri="{909E8E84-426E-40DD-AFC4-6F175D3DCCD1}">
+              <a14:hiddenFill xmlns:a14="http://schemas.microsoft.com/office/drawing/2010/main">
+                <a:solidFill>
+                  <a:srgbClr val="FFFFFF"/>
+                </a:solidFill>
+              </a14:hiddenFill>
+            </a:ext>
+          </a:extLst>
+        </p:spPr>
+      </p:pic>
     </p:spTree>
     <p:extLst>
       <p:ext uri="{BB962C8B-B14F-4D97-AF65-F5344CB8AC3E}">
-        <p14:creationId xmlns:p14="http://schemas.microsoft.com/office/powerpoint/2010/main" val="203272837"/>
+        <p14:creationId xmlns:p14="http://schemas.microsoft.com/office/powerpoint/2010/main" val="213668556"/>
       </p:ext>
     </p:extLst>
   </p:cSld>

</xml_diff>